<commit_message>
Updating figures for color blind people. Adding patterns
</commit_message>
<xml_diff>
--- a/results/images/survey_evaluation.pptx
+++ b/results/images/survey_evaluation.pptx
@@ -104,6 +104,11 @@
       </a:defRPr>
     </a:lvl9pPr>
   </p:defaultTextStyle>
+  <p:extLst>
+    <p:ext uri="{EFAFB233-063F-42B5-8137-9DF3F51BA10A}">
+      <p15:sldGuideLst xmlns:p15="http://schemas.microsoft.com/office/powerpoint/2012/main"/>
+    </p:ext>
+  </p:extLst>
 </p:presentation>
 </file>
 
@@ -153,11 +158,18 @@
             </c:strRef>
           </c:tx>
           <c:spPr>
-            <a:solidFill>
-              <a:srgbClr val="00B050"/>
-            </a:solidFill>
-            <a:ln>
-              <a:noFill/>
+            <a:pattFill prst="wdUpDiag">
+              <a:fgClr>
+                <a:schemeClr val="tx1"/>
+              </a:fgClr>
+              <a:bgClr>
+                <a:schemeClr val="accent1"/>
+              </a:bgClr>
+            </a:pattFill>
+            <a:ln w="3175">
+              <a:solidFill>
+                <a:schemeClr val="tx1"/>
+              </a:solidFill>
             </a:ln>
             <a:effectLst/>
           </c:spPr>
@@ -236,11 +248,18 @@
             </c:strRef>
           </c:tx>
           <c:spPr>
-            <a:solidFill>
-              <a:srgbClr val="FFC000"/>
-            </a:solidFill>
-            <a:ln>
-              <a:noFill/>
+            <a:pattFill prst="lgGrid">
+              <a:fgClr>
+                <a:schemeClr val="tx1"/>
+              </a:fgClr>
+              <a:bgClr>
+                <a:srgbClr val="FD6148"/>
+              </a:bgClr>
+            </a:pattFill>
+            <a:ln w="3175">
+              <a:solidFill>
+                <a:schemeClr val="tx1"/>
+              </a:solidFill>
             </a:ln>
             <a:effectLst/>
           </c:spPr>
@@ -319,11 +338,18 @@
             </c:strRef>
           </c:tx>
           <c:spPr>
-            <a:solidFill>
-              <a:schemeClr val="accent2"/>
-            </a:solidFill>
-            <a:ln>
-              <a:noFill/>
+            <a:pattFill prst="solidDmnd">
+              <a:fgClr>
+                <a:schemeClr val="tx1"/>
+              </a:fgClr>
+              <a:bgClr>
+                <a:srgbClr val="9341D3"/>
+              </a:bgClr>
+            </a:pattFill>
+            <a:ln w="3175">
+              <a:solidFill>
+                <a:schemeClr val="tx1"/>
+              </a:solidFill>
             </a:ln>
             <a:effectLst/>
           </c:spPr>
@@ -403,10 +429,12 @@
           </c:tx>
           <c:spPr>
             <a:solidFill>
-              <a:srgbClr val="FF2121"/>
+              <a:schemeClr val="accent6"/>
             </a:solidFill>
-            <a:ln>
-              <a:noFill/>
+            <a:ln w="3175">
+              <a:solidFill>
+                <a:schemeClr val="tx1"/>
+              </a:solidFill>
             </a:ln>
             <a:effectLst/>
           </c:spPr>
@@ -693,11 +721,16 @@
         <c:majorUnit val="10"/>
       </c:valAx>
       <c:spPr>
-        <a:solidFill>
-          <a:schemeClr val="bg1">
-            <a:lumMod val="95000"/>
-          </a:schemeClr>
-        </a:solidFill>
+        <a:pattFill prst="pct5">
+          <a:fgClr>
+            <a:schemeClr val="bg1">
+              <a:lumMod val="95000"/>
+            </a:schemeClr>
+          </a:fgClr>
+          <a:bgClr>
+            <a:schemeClr val="bg1"/>
+          </a:bgClr>
+        </a:pattFill>
         <a:ln>
           <a:noFill/>
         </a:ln>
@@ -782,10 +815,10 @@
 </file>
 
 <file path=ppt/charts/colors1.xml><?xml version="1.0" encoding="utf-8"?>
-<cs:colorStyle xmlns:cs="http://schemas.microsoft.com/office/drawing/2012/chartStyle" xmlns:a="http://schemas.openxmlformats.org/drawingml/2006/main" meth="cycle" id="13">
+<cs:colorStyle xmlns:cs="http://schemas.microsoft.com/office/drawing/2012/chartStyle" xmlns:a="http://schemas.openxmlformats.org/drawingml/2006/main" meth="cycle" id="12">
+  <a:schemeClr val="accent2"/>
+  <a:schemeClr val="accent4"/>
   <a:schemeClr val="accent6"/>
-  <a:schemeClr val="accent5"/>
-  <a:schemeClr val="accent4"/>
   <cs:variation/>
   <cs:variation>
     <a:lumMod val="60000"/>
@@ -1454,7 +1487,7 @@
           <a:p>
             <a:fld id="{095680D3-45DF-4A57-A9C0-1288ACF88376}" type="datetimeFigureOut">
               <a:rPr lang="en-US" smtClean="0"/>
-              <a:t>8/29/2022</a:t>
+              <a:t>5/19/23</a:t>
             </a:fld>
             <a:endParaRPr lang="en-US"/>
           </a:p>
@@ -1624,7 +1657,7 @@
           <a:p>
             <a:fld id="{095680D3-45DF-4A57-A9C0-1288ACF88376}" type="datetimeFigureOut">
               <a:rPr lang="en-US" smtClean="0"/>
-              <a:t>8/29/2022</a:t>
+              <a:t>5/19/23</a:t>
             </a:fld>
             <a:endParaRPr lang="en-US"/>
           </a:p>
@@ -1804,7 +1837,7 @@
           <a:p>
             <a:fld id="{095680D3-45DF-4A57-A9C0-1288ACF88376}" type="datetimeFigureOut">
               <a:rPr lang="en-US" smtClean="0"/>
-              <a:t>8/29/2022</a:t>
+              <a:t>5/19/23</a:t>
             </a:fld>
             <a:endParaRPr lang="en-US"/>
           </a:p>
@@ -1974,7 +2007,7 @@
           <a:p>
             <a:fld id="{095680D3-45DF-4A57-A9C0-1288ACF88376}" type="datetimeFigureOut">
               <a:rPr lang="en-US" smtClean="0"/>
-              <a:t>8/29/2022</a:t>
+              <a:t>5/19/23</a:t>
             </a:fld>
             <a:endParaRPr lang="en-US"/>
           </a:p>
@@ -2218,7 +2251,7 @@
           <a:p>
             <a:fld id="{095680D3-45DF-4A57-A9C0-1288ACF88376}" type="datetimeFigureOut">
               <a:rPr lang="en-US" smtClean="0"/>
-              <a:t>8/29/2022</a:t>
+              <a:t>5/19/23</a:t>
             </a:fld>
             <a:endParaRPr lang="en-US"/>
           </a:p>
@@ -2450,7 +2483,7 @@
           <a:p>
             <a:fld id="{095680D3-45DF-4A57-A9C0-1288ACF88376}" type="datetimeFigureOut">
               <a:rPr lang="en-US" smtClean="0"/>
-              <a:t>8/29/2022</a:t>
+              <a:t>5/19/23</a:t>
             </a:fld>
             <a:endParaRPr lang="en-US"/>
           </a:p>
@@ -2817,7 +2850,7 @@
           <a:p>
             <a:fld id="{095680D3-45DF-4A57-A9C0-1288ACF88376}" type="datetimeFigureOut">
               <a:rPr lang="en-US" smtClean="0"/>
-              <a:t>8/29/2022</a:t>
+              <a:t>5/19/23</a:t>
             </a:fld>
             <a:endParaRPr lang="en-US"/>
           </a:p>
@@ -2935,7 +2968,7 @@
           <a:p>
             <a:fld id="{095680D3-45DF-4A57-A9C0-1288ACF88376}" type="datetimeFigureOut">
               <a:rPr lang="en-US" smtClean="0"/>
-              <a:t>8/29/2022</a:t>
+              <a:t>5/19/23</a:t>
             </a:fld>
             <a:endParaRPr lang="en-US"/>
           </a:p>
@@ -3030,7 +3063,7 @@
           <a:p>
             <a:fld id="{095680D3-45DF-4A57-A9C0-1288ACF88376}" type="datetimeFigureOut">
               <a:rPr lang="en-US" smtClean="0"/>
-              <a:t>8/29/2022</a:t>
+              <a:t>5/19/23</a:t>
             </a:fld>
             <a:endParaRPr lang="en-US"/>
           </a:p>
@@ -3307,7 +3340,7 @@
           <a:p>
             <a:fld id="{095680D3-45DF-4A57-A9C0-1288ACF88376}" type="datetimeFigureOut">
               <a:rPr lang="en-US" smtClean="0"/>
-              <a:t>8/29/2022</a:t>
+              <a:t>5/19/23</a:t>
             </a:fld>
             <a:endParaRPr lang="en-US"/>
           </a:p>
@@ -3564,7 +3597,7 @@
           <a:p>
             <a:fld id="{095680D3-45DF-4A57-A9C0-1288ACF88376}" type="datetimeFigureOut">
               <a:rPr lang="en-US" smtClean="0"/>
-              <a:t>8/29/2022</a:t>
+              <a:t>5/19/23</a:t>
             </a:fld>
             <a:endParaRPr lang="en-US"/>
           </a:p>
@@ -3777,7 +3810,7 @@
           <a:p>
             <a:fld id="{095680D3-45DF-4A57-A9C0-1288ACF88376}" type="datetimeFigureOut">
               <a:rPr lang="en-US" smtClean="0"/>
-              <a:t>8/29/2022</a:t>
+              <a:t>5/19/23</a:t>
             </a:fld>
             <a:endParaRPr lang="en-US"/>
           </a:p>
@@ -4197,7 +4230,7 @@
           <p:nvPr>
             <p:extLst>
               <p:ext uri="{D42A27DB-BD31-4B8C-83A1-F6EECF244321}">
-                <p14:modId xmlns:p14="http://schemas.microsoft.com/office/powerpoint/2010/main" val="778415247"/>
+                <p14:modId xmlns:p14="http://schemas.microsoft.com/office/powerpoint/2010/main" val="442074845"/>
               </p:ext>
             </p:extLst>
           </p:nvPr>

</xml_diff>